<commit_message>
Homepage div adjusted and group member name added to the presentaion
Homepage div adjusted and group member name added to the presentaion
</commit_message>
<xml_diff>
--- a/MATHS SPRINT presentation.pptx
+++ b/MATHS SPRINT presentation.pptx
@@ -6,16 +6,16 @@
   </p:sldMasterIdLst>
   <p:sldIdLst>
     <p:sldId id="256" r:id="rId2"/>
-    <p:sldId id="265" r:id="rId3"/>
-    <p:sldId id="257" r:id="rId4"/>
-    <p:sldId id="263" r:id="rId5"/>
-    <p:sldId id="266" r:id="rId6"/>
-    <p:sldId id="264" r:id="rId7"/>
-    <p:sldId id="258" r:id="rId8"/>
-    <p:sldId id="259" r:id="rId9"/>
-    <p:sldId id="261" r:id="rId10"/>
-    <p:sldId id="262" r:id="rId11"/>
-    <p:sldId id="260" r:id="rId12"/>
+    <p:sldId id="260" r:id="rId3"/>
+    <p:sldId id="265" r:id="rId4"/>
+    <p:sldId id="257" r:id="rId5"/>
+    <p:sldId id="263" r:id="rId6"/>
+    <p:sldId id="266" r:id="rId7"/>
+    <p:sldId id="264" r:id="rId8"/>
+    <p:sldId id="258" r:id="rId9"/>
+    <p:sldId id="259" r:id="rId10"/>
+    <p:sldId id="261" r:id="rId11"/>
+    <p:sldId id="262" r:id="rId12"/>
   </p:sldIdLst>
   <p:sldSz cx="12192000" cy="6858000"/>
   <p:notesSz cx="6858000" cy="9144000"/>
@@ -120,6 +120,35 @@
     </p:ext>
   </p:extLst>
 </p:presentation>
+</file>
+
+<file path=ppt/changesInfos/changesInfo1.xml><?xml version="1.0" encoding="utf-8"?>
+<pc:chgInfo xmlns:a="http://schemas.openxmlformats.org/drawingml/2006/main" xmlns:r="http://schemas.openxmlformats.org/officeDocument/2006/relationships" xmlns:ac="http://schemas.microsoft.com/office/drawing/2013/main/command" xmlns:pc="http://schemas.microsoft.com/office/powerpoint/2013/main/command">
+  <pc:docChgLst>
+    <pc:chgData name="tolulope" userId="9a604e0166f14ce9" providerId="LiveId" clId="{E9A3F9A0-5FFE-4ED1-B5D6-B4F791A26C94}"/>
+    <pc:docChg chg="modSld sldOrd">
+      <pc:chgData name="tolulope" userId="9a604e0166f14ce9" providerId="LiveId" clId="{E9A3F9A0-5FFE-4ED1-B5D6-B4F791A26C94}" dt="2023-06-23T09:50:26.283" v="47" actId="20577"/>
+      <pc:docMkLst>
+        <pc:docMk/>
+      </pc:docMkLst>
+      <pc:sldChg chg="modSp mod ord">
+        <pc:chgData name="tolulope" userId="9a604e0166f14ce9" providerId="LiveId" clId="{E9A3F9A0-5FFE-4ED1-B5D6-B4F791A26C94}" dt="2023-06-23T09:50:26.283" v="47" actId="20577"/>
+        <pc:sldMkLst>
+          <pc:docMk/>
+          <pc:sldMk cId="449107453" sldId="260"/>
+        </pc:sldMkLst>
+        <pc:spChg chg="mod">
+          <ac:chgData name="tolulope" userId="9a604e0166f14ce9" providerId="LiveId" clId="{E9A3F9A0-5FFE-4ED1-B5D6-B4F791A26C94}" dt="2023-06-23T09:50:26.283" v="47" actId="20577"/>
+          <ac:spMkLst>
+            <pc:docMk/>
+            <pc:sldMk cId="449107453" sldId="260"/>
+            <ac:spMk id="3" creationId="{FF7A7B90-CABA-F0E7-503B-7322D3E42FB9}"/>
+          </ac:spMkLst>
+        </pc:spChg>
+      </pc:sldChg>
+    </pc:docChg>
+  </pc:docChgLst>
+</pc:chgInfo>
 </file>
 
 <file path=ppt/slideLayouts/slideLayout1.xml><?xml version="1.0" encoding="utf-8"?>
@@ -845,7 +874,7 @@
             <a:fld id="{48A87A34-81AB-432B-8DAE-1953F412C126}" type="datetimeFigureOut">
               <a:rPr lang="en-US" smtClean="0"/>
               <a:pPr/>
-              <a:t>6/22/2023</a:t>
+              <a:t>6/23/2023</a:t>
             </a:fld>
             <a:endParaRPr lang="en-US" dirty="0"/>
           </a:p>
@@ -1097,7 +1126,7 @@
             <a:fld id="{48A87A34-81AB-432B-8DAE-1953F412C126}" type="datetimeFigureOut">
               <a:rPr lang="en-US" smtClean="0"/>
               <a:pPr/>
-              <a:t>6/22/2023</a:t>
+              <a:t>6/23/2023</a:t>
             </a:fld>
             <a:endParaRPr lang="en-US" dirty="0"/>
           </a:p>
@@ -1413,7 +1442,7 @@
             <a:fld id="{48A87A34-81AB-432B-8DAE-1953F412C126}" type="datetimeFigureOut">
               <a:rPr lang="en-US" smtClean="0"/>
               <a:pPr/>
-              <a:t>6/22/2023</a:t>
+              <a:t>6/23/2023</a:t>
             </a:fld>
             <a:endParaRPr lang="en-US" dirty="0"/>
           </a:p>
@@ -1756,7 +1785,7 @@
             <a:fld id="{48A87A34-81AB-432B-8DAE-1953F412C126}" type="datetimeFigureOut">
               <a:rPr lang="en-US" smtClean="0"/>
               <a:pPr/>
-              <a:t>6/22/2023</a:t>
+              <a:t>6/23/2023</a:t>
             </a:fld>
             <a:endParaRPr lang="en-US" dirty="0"/>
           </a:p>
@@ -2072,7 +2101,7 @@
             <a:fld id="{48A87A34-81AB-432B-8DAE-1953F412C126}" type="datetimeFigureOut">
               <a:rPr lang="en-US" smtClean="0"/>
               <a:pPr/>
-              <a:t>6/22/2023</a:t>
+              <a:t>6/23/2023</a:t>
             </a:fld>
             <a:endParaRPr lang="en-US" dirty="0"/>
           </a:p>
@@ -2467,7 +2496,7 @@
             <a:fld id="{48A87A34-81AB-432B-8DAE-1953F412C126}" type="datetimeFigureOut">
               <a:rPr lang="en-US" smtClean="0"/>
               <a:pPr/>
-              <a:t>6/22/2023</a:t>
+              <a:t>6/23/2023</a:t>
             </a:fld>
             <a:endParaRPr lang="en-US" dirty="0"/>
           </a:p>
@@ -2638,7 +2667,7 @@
           <a:p>
             <a:fld id="{48A87A34-81AB-432B-8DAE-1953F412C126}" type="datetimeFigureOut">
               <a:rPr lang="en-US" smtClean="0"/>
-              <a:t>6/22/2023</a:t>
+              <a:t>6/23/2023</a:t>
             </a:fld>
             <a:endParaRPr lang="en-US" dirty="0"/>
           </a:p>
@@ -2818,7 +2847,7 @@
           <a:p>
             <a:fld id="{48A87A34-81AB-432B-8DAE-1953F412C126}" type="datetimeFigureOut">
               <a:rPr lang="en-US" smtClean="0"/>
-              <a:t>6/22/2023</a:t>
+              <a:t>6/23/2023</a:t>
             </a:fld>
             <a:endParaRPr lang="en-US" dirty="0"/>
           </a:p>
@@ -2994,7 +3023,7 @@
           <a:p>
             <a:fld id="{48A87A34-81AB-432B-8DAE-1953F412C126}" type="datetimeFigureOut">
               <a:rPr lang="en-US" smtClean="0"/>
-              <a:t>6/22/2023</a:t>
+              <a:t>6/23/2023</a:t>
             </a:fld>
             <a:endParaRPr lang="en-US" dirty="0"/>
           </a:p>
@@ -3241,7 +3270,7 @@
           <a:p>
             <a:fld id="{48A87A34-81AB-432B-8DAE-1953F412C126}" type="datetimeFigureOut">
               <a:rPr lang="en-US" smtClean="0"/>
-              <a:t>6/22/2023</a:t>
+              <a:t>6/23/2023</a:t>
             </a:fld>
             <a:endParaRPr lang="en-US" dirty="0"/>
           </a:p>
@@ -3473,7 +3502,7 @@
           <a:p>
             <a:fld id="{48A87A34-81AB-432B-8DAE-1953F412C126}" type="datetimeFigureOut">
               <a:rPr lang="en-US" smtClean="0"/>
-              <a:t>6/22/2023</a:t>
+              <a:t>6/23/2023</a:t>
             </a:fld>
             <a:endParaRPr lang="en-US" dirty="0"/>
           </a:p>
@@ -3847,7 +3876,7 @@
           <a:p>
             <a:fld id="{48A87A34-81AB-432B-8DAE-1953F412C126}" type="datetimeFigureOut">
               <a:rPr lang="en-US" smtClean="0"/>
-              <a:t>6/22/2023</a:t>
+              <a:t>6/23/2023</a:t>
             </a:fld>
             <a:endParaRPr lang="en-US" dirty="0"/>
           </a:p>
@@ -3970,7 +3999,7 @@
           <a:p>
             <a:fld id="{48A87A34-81AB-432B-8DAE-1953F412C126}" type="datetimeFigureOut">
               <a:rPr lang="en-US" smtClean="0"/>
-              <a:t>6/22/2023</a:t>
+              <a:t>6/23/2023</a:t>
             </a:fld>
             <a:endParaRPr lang="en-US" dirty="0"/>
           </a:p>
@@ -4065,7 +4094,7 @@
           <a:p>
             <a:fld id="{48A87A34-81AB-432B-8DAE-1953F412C126}" type="datetimeFigureOut">
               <a:rPr lang="en-US" smtClean="0"/>
-              <a:t>6/22/2023</a:t>
+              <a:t>6/23/2023</a:t>
             </a:fld>
             <a:endParaRPr lang="en-US" dirty="0"/>
           </a:p>
@@ -4320,7 +4349,7 @@
           <a:p>
             <a:fld id="{48A87A34-81AB-432B-8DAE-1953F412C126}" type="datetimeFigureOut">
               <a:rPr lang="en-US" smtClean="0"/>
-              <a:t>6/22/2023</a:t>
+              <a:t>6/23/2023</a:t>
             </a:fld>
             <a:endParaRPr lang="en-US" dirty="0"/>
           </a:p>
@@ -4583,7 +4612,7 @@
           <a:p>
             <a:fld id="{48A87A34-81AB-432B-8DAE-1953F412C126}" type="datetimeFigureOut">
               <a:rPr lang="en-US" smtClean="0"/>
-              <a:t>6/22/2023</a:t>
+              <a:t>6/23/2023</a:t>
             </a:fld>
             <a:endParaRPr lang="en-US" dirty="0"/>
           </a:p>
@@ -5327,7 +5356,7 @@
             <a:fld id="{48A87A34-81AB-432B-8DAE-1953F412C126}" type="datetimeFigureOut">
               <a:rPr lang="en-US" smtClean="0"/>
               <a:pPr/>
-              <a:t>6/22/2023</a:t>
+              <a:t>6/23/2023</a:t>
             </a:fld>
             <a:endParaRPr lang="en-US" dirty="0"/>
           </a:p>
@@ -5943,6 +5972,90 @@
           <p:cNvPr id="2" name="Title 1">
             <a:extLst>
               <a:ext uri="{FF2B5EF4-FFF2-40B4-BE49-F238E27FC236}">
+                <a16:creationId xmlns:a16="http://schemas.microsoft.com/office/drawing/2014/main" id="{0AE54B6D-E5EF-2254-EC3E-732022D51D69}"/>
+              </a:ext>
+            </a:extLst>
+          </p:cNvPr>
+          <p:cNvSpPr>
+            <a:spLocks noGrp="1"/>
+          </p:cNvSpPr>
+          <p:nvPr>
+            <p:ph type="title"/>
+          </p:nvPr>
+        </p:nvSpPr>
+        <p:spPr/>
+        <p:txBody>
+          <a:bodyPr/>
+          <a:lstStyle/>
+          <a:p>
+            <a:endParaRPr lang="en-US"/>
+          </a:p>
+        </p:txBody>
+      </p:sp>
+      <p:pic>
+        <p:nvPicPr>
+          <p:cNvPr id="5" name="Content Placeholder 4">
+            <a:extLst>
+              <a:ext uri="{FF2B5EF4-FFF2-40B4-BE49-F238E27FC236}">
+                <a16:creationId xmlns:a16="http://schemas.microsoft.com/office/drawing/2014/main" id="{6B07E922-5EAC-CBB5-4BB6-8DA6C42210FB}"/>
+              </a:ext>
+            </a:extLst>
+          </p:cNvPr>
+          <p:cNvPicPr>
+            <a:picLocks noGrp="1" noChangeAspect="1"/>
+          </p:cNvPicPr>
+          <p:nvPr>
+            <p:ph idx="1"/>
+          </p:nvPr>
+        </p:nvPicPr>
+        <p:blipFill>
+          <a:blip r:embed="rId2"/>
+          <a:stretch>
+            <a:fillRect/>
+          </a:stretch>
+        </p:blipFill>
+        <p:spPr>
+          <a:xfrm>
+            <a:off x="1525853" y="2160588"/>
+            <a:ext cx="6900332" cy="3881437"/>
+          </a:xfrm>
+        </p:spPr>
+      </p:pic>
+    </p:spTree>
+    <p:extLst>
+      <p:ext uri="{BB962C8B-B14F-4D97-AF65-F5344CB8AC3E}">
+        <p14:creationId xmlns:p14="http://schemas.microsoft.com/office/powerpoint/2010/main" val="2882547128"/>
+      </p:ext>
+    </p:extLst>
+  </p:cSld>
+  <p:clrMapOvr>
+    <a:masterClrMapping/>
+  </p:clrMapOvr>
+</p:sld>
+</file>
+
+<file path=ppt/slides/slide11.xml><?xml version="1.0" encoding="utf-8"?>
+<p:sld xmlns:a="http://schemas.openxmlformats.org/drawingml/2006/main" xmlns:r="http://schemas.openxmlformats.org/officeDocument/2006/relationships" xmlns:p="http://schemas.openxmlformats.org/presentationml/2006/main">
+  <p:cSld>
+    <p:spTree>
+      <p:nvGrpSpPr>
+        <p:cNvPr id="1" name=""/>
+        <p:cNvGrpSpPr/>
+        <p:nvPr/>
+      </p:nvGrpSpPr>
+      <p:grpSpPr>
+        <a:xfrm>
+          <a:off x="0" y="0"/>
+          <a:ext cx="0" cy="0"/>
+          <a:chOff x="0" y="0"/>
+          <a:chExt cx="0" cy="0"/>
+        </a:xfrm>
+      </p:grpSpPr>
+      <p:sp>
+        <p:nvSpPr>
+          <p:cNvPr id="2" name="Title 1">
+            <a:extLst>
+              <a:ext uri="{FF2B5EF4-FFF2-40B4-BE49-F238E27FC236}">
                 <a16:creationId xmlns:a16="http://schemas.microsoft.com/office/drawing/2014/main" id="{E5DCDA9D-0514-4317-23E0-9170BCE2F28E}"/>
               </a:ext>
             </a:extLst>
@@ -6005,7 +6118,7 @@
 </p:sld>
 </file>
 
-<file path=ppt/slides/slide11.xml><?xml version="1.0" encoding="utf-8"?>
+<file path=ppt/slides/slide2.xml><?xml version="1.0" encoding="utf-8"?>
 <p:sld xmlns:a="http://schemas.openxmlformats.org/drawingml/2006/main" xmlns:r="http://schemas.openxmlformats.org/officeDocument/2006/relationships" xmlns:p="http://schemas.openxmlformats.org/presentationml/2006/main">
   <p:cSld>
     <p:spTree>
@@ -6100,6 +6213,13 @@
               <a:t>HERITAGE</a:t>
             </a:r>
           </a:p>
+          <a:p>
+            <a:r>
+              <a:rPr lang="en-US"/>
+              <a:t>OMOKEJIMI SAMUEL</a:t>
+            </a:r>
+            <a:endParaRPr lang="en-US" dirty="0"/>
+          </a:p>
         </p:txBody>
       </p:sp>
     </p:spTree>
@@ -6115,7 +6235,7 @@
 </p:sld>
 </file>
 
-<file path=ppt/slides/slide2.xml><?xml version="1.0" encoding="utf-8"?>
+<file path=ppt/slides/slide3.xml><?xml version="1.0" encoding="utf-8"?>
 <p:sld xmlns:a="http://schemas.openxmlformats.org/drawingml/2006/main" xmlns:r="http://schemas.openxmlformats.org/officeDocument/2006/relationships" xmlns:p="http://schemas.openxmlformats.org/presentationml/2006/main">
   <p:cSld>
     <p:spTree>
@@ -6389,7 +6509,7 @@
 </p:sld>
 </file>
 
-<file path=ppt/slides/slide3.xml><?xml version="1.0" encoding="utf-8"?>
+<file path=ppt/slides/slide4.xml><?xml version="1.0" encoding="utf-8"?>
 <p:sld xmlns:a="http://schemas.openxmlformats.org/drawingml/2006/main" xmlns:r="http://schemas.openxmlformats.org/officeDocument/2006/relationships" xmlns:p="http://schemas.openxmlformats.org/presentationml/2006/main">
   <p:cSld>
     <p:spTree>
@@ -6563,7 +6683,7 @@
 </p:sld>
 </file>
 
-<file path=ppt/slides/slide4.xml><?xml version="1.0" encoding="utf-8"?>
+<file path=ppt/slides/slide5.xml><?xml version="1.0" encoding="utf-8"?>
 <p:sld xmlns:a="http://schemas.openxmlformats.org/drawingml/2006/main" xmlns:r="http://schemas.openxmlformats.org/officeDocument/2006/relationships" xmlns:p="http://schemas.openxmlformats.org/presentationml/2006/main">
   <p:cSld>
     <p:spTree>
@@ -6656,124 +6776,6 @@
 </p:sld>
 </file>
 
-<file path=ppt/slides/slide5.xml><?xml version="1.0" encoding="utf-8"?>
-<p:sld xmlns:a="http://schemas.openxmlformats.org/drawingml/2006/main" xmlns:r="http://schemas.openxmlformats.org/officeDocument/2006/relationships" xmlns:p="http://schemas.openxmlformats.org/presentationml/2006/main">
-  <p:cSld>
-    <p:spTree>
-      <p:nvGrpSpPr>
-        <p:cNvPr id="1" name=""/>
-        <p:cNvGrpSpPr/>
-        <p:nvPr/>
-      </p:nvGrpSpPr>
-      <p:grpSpPr>
-        <a:xfrm>
-          <a:off x="0" y="0"/>
-          <a:ext cx="0" cy="0"/>
-          <a:chOff x="0" y="0"/>
-          <a:chExt cx="0" cy="0"/>
-        </a:xfrm>
-      </p:grpSpPr>
-      <p:sp>
-        <p:nvSpPr>
-          <p:cNvPr id="2" name="Title 1">
-            <a:extLst>
-              <a:ext uri="{FF2B5EF4-FFF2-40B4-BE49-F238E27FC236}">
-                <a16:creationId xmlns:a16="http://schemas.microsoft.com/office/drawing/2014/main" id="{1CC8508D-855D-3532-020B-459B8FCA0E83}"/>
-              </a:ext>
-            </a:extLst>
-          </p:cNvPr>
-          <p:cNvSpPr>
-            <a:spLocks noGrp="1"/>
-          </p:cNvSpPr>
-          <p:nvPr>
-            <p:ph type="title"/>
-          </p:nvPr>
-        </p:nvSpPr>
-        <p:spPr/>
-        <p:txBody>
-          <a:bodyPr/>
-          <a:lstStyle/>
-          <a:p>
-            <a:r>
-              <a:rPr lang="en-US" dirty="0"/>
-              <a:t>limitation</a:t>
-            </a:r>
-          </a:p>
-        </p:txBody>
-      </p:sp>
-      <p:sp>
-        <p:nvSpPr>
-          <p:cNvPr id="3" name="Content Placeholder 2">
-            <a:extLst>
-              <a:ext uri="{FF2B5EF4-FFF2-40B4-BE49-F238E27FC236}">
-                <a16:creationId xmlns:a16="http://schemas.microsoft.com/office/drawing/2014/main" id="{492445C0-3450-9F2D-6AD1-F4D237D6B1BC}"/>
-              </a:ext>
-            </a:extLst>
-          </p:cNvPr>
-          <p:cNvSpPr>
-            <a:spLocks noGrp="1"/>
-          </p:cNvSpPr>
-          <p:nvPr>
-            <p:ph idx="1"/>
-          </p:nvPr>
-        </p:nvSpPr>
-        <p:spPr/>
-        <p:txBody>
-          <a:bodyPr>
-            <a:normAutofit/>
-          </a:bodyPr>
-          <a:lstStyle/>
-          <a:p>
-            <a:r>
-              <a:rPr lang="en-US" sz="7200" dirty="0">
-                <a:solidFill>
-                  <a:schemeClr val="accent4">
-                    <a:lumMod val="75000"/>
-                  </a:schemeClr>
-                </a:solidFill>
-              </a:rPr>
-              <a:t>Single player </a:t>
-            </a:r>
-          </a:p>
-          <a:p>
-            <a:r>
-              <a:rPr lang="en-US" sz="7200" dirty="0">
-                <a:solidFill>
-                  <a:schemeClr val="accent4">
-                    <a:lumMod val="75000"/>
-                  </a:schemeClr>
-                </a:solidFill>
-              </a:rPr>
-              <a:t>Questions based </a:t>
-            </a:r>
-          </a:p>
-          <a:p>
-            <a:r>
-              <a:rPr lang="en-US" sz="7200" dirty="0">
-                <a:solidFill>
-                  <a:schemeClr val="accent4">
-                    <a:lumMod val="75000"/>
-                  </a:schemeClr>
-                </a:solidFill>
-              </a:rPr>
-              <a:t>UI/Work</a:t>
-            </a:r>
-          </a:p>
-        </p:txBody>
-      </p:sp>
-    </p:spTree>
-    <p:extLst>
-      <p:ext uri="{BB962C8B-B14F-4D97-AF65-F5344CB8AC3E}">
-        <p14:creationId xmlns:p14="http://schemas.microsoft.com/office/powerpoint/2010/main" val="1801815678"/>
-      </p:ext>
-    </p:extLst>
-  </p:cSld>
-  <p:clrMapOvr>
-    <a:masterClrMapping/>
-  </p:clrMapOvr>
-</p:sld>
-</file>
-
 <file path=ppt/slides/slide6.xml><?xml version="1.0" encoding="utf-8"?>
 <p:sld xmlns:a="http://schemas.openxmlformats.org/drawingml/2006/main" xmlns:r="http://schemas.openxmlformats.org/officeDocument/2006/relationships" xmlns:p="http://schemas.openxmlformats.org/presentationml/2006/main">
   <p:cSld>
@@ -6796,6 +6798,124 @@
           <p:cNvPr id="2" name="Title 1">
             <a:extLst>
               <a:ext uri="{FF2B5EF4-FFF2-40B4-BE49-F238E27FC236}">
+                <a16:creationId xmlns:a16="http://schemas.microsoft.com/office/drawing/2014/main" id="{1CC8508D-855D-3532-020B-459B8FCA0E83}"/>
+              </a:ext>
+            </a:extLst>
+          </p:cNvPr>
+          <p:cNvSpPr>
+            <a:spLocks noGrp="1"/>
+          </p:cNvSpPr>
+          <p:nvPr>
+            <p:ph type="title"/>
+          </p:nvPr>
+        </p:nvSpPr>
+        <p:spPr/>
+        <p:txBody>
+          <a:bodyPr/>
+          <a:lstStyle/>
+          <a:p>
+            <a:r>
+              <a:rPr lang="en-US" dirty="0"/>
+              <a:t>limitation</a:t>
+            </a:r>
+          </a:p>
+        </p:txBody>
+      </p:sp>
+      <p:sp>
+        <p:nvSpPr>
+          <p:cNvPr id="3" name="Content Placeholder 2">
+            <a:extLst>
+              <a:ext uri="{FF2B5EF4-FFF2-40B4-BE49-F238E27FC236}">
+                <a16:creationId xmlns:a16="http://schemas.microsoft.com/office/drawing/2014/main" id="{492445C0-3450-9F2D-6AD1-F4D237D6B1BC}"/>
+              </a:ext>
+            </a:extLst>
+          </p:cNvPr>
+          <p:cNvSpPr>
+            <a:spLocks noGrp="1"/>
+          </p:cNvSpPr>
+          <p:nvPr>
+            <p:ph idx="1"/>
+          </p:nvPr>
+        </p:nvSpPr>
+        <p:spPr/>
+        <p:txBody>
+          <a:bodyPr>
+            <a:normAutofit/>
+          </a:bodyPr>
+          <a:lstStyle/>
+          <a:p>
+            <a:r>
+              <a:rPr lang="en-US" sz="7200" dirty="0">
+                <a:solidFill>
+                  <a:schemeClr val="accent4">
+                    <a:lumMod val="75000"/>
+                  </a:schemeClr>
+                </a:solidFill>
+              </a:rPr>
+              <a:t>Single player </a:t>
+            </a:r>
+          </a:p>
+          <a:p>
+            <a:r>
+              <a:rPr lang="en-US" sz="7200" dirty="0">
+                <a:solidFill>
+                  <a:schemeClr val="accent4">
+                    <a:lumMod val="75000"/>
+                  </a:schemeClr>
+                </a:solidFill>
+              </a:rPr>
+              <a:t>Questions based </a:t>
+            </a:r>
+          </a:p>
+          <a:p>
+            <a:r>
+              <a:rPr lang="en-US" sz="7200" dirty="0">
+                <a:solidFill>
+                  <a:schemeClr val="accent4">
+                    <a:lumMod val="75000"/>
+                  </a:schemeClr>
+                </a:solidFill>
+              </a:rPr>
+              <a:t>UI/Work</a:t>
+            </a:r>
+          </a:p>
+        </p:txBody>
+      </p:sp>
+    </p:spTree>
+    <p:extLst>
+      <p:ext uri="{BB962C8B-B14F-4D97-AF65-F5344CB8AC3E}">
+        <p14:creationId xmlns:p14="http://schemas.microsoft.com/office/powerpoint/2010/main" val="1801815678"/>
+      </p:ext>
+    </p:extLst>
+  </p:cSld>
+  <p:clrMapOvr>
+    <a:masterClrMapping/>
+  </p:clrMapOvr>
+</p:sld>
+</file>
+
+<file path=ppt/slides/slide7.xml><?xml version="1.0" encoding="utf-8"?>
+<p:sld xmlns:a="http://schemas.openxmlformats.org/drawingml/2006/main" xmlns:r="http://schemas.openxmlformats.org/officeDocument/2006/relationships" xmlns:p="http://schemas.openxmlformats.org/presentationml/2006/main">
+  <p:cSld>
+    <p:spTree>
+      <p:nvGrpSpPr>
+        <p:cNvPr id="1" name=""/>
+        <p:cNvGrpSpPr/>
+        <p:nvPr/>
+      </p:nvGrpSpPr>
+      <p:grpSpPr>
+        <a:xfrm>
+          <a:off x="0" y="0"/>
+          <a:ext cx="0" cy="0"/>
+          <a:chOff x="0" y="0"/>
+          <a:chExt cx="0" cy="0"/>
+        </a:xfrm>
+      </p:grpSpPr>
+      <p:sp>
+        <p:nvSpPr>
+          <p:cNvPr id="2" name="Title 1">
+            <a:extLst>
+              <a:ext uri="{FF2B5EF4-FFF2-40B4-BE49-F238E27FC236}">
                 <a16:creationId xmlns:a16="http://schemas.microsoft.com/office/drawing/2014/main" id="{58408877-0798-1B17-9020-75A93D12154A}"/>
               </a:ext>
             </a:extLst>
@@ -6890,7 +7010,7 @@
 </p:sld>
 </file>
 
-<file path=ppt/slides/slide7.xml><?xml version="1.0" encoding="utf-8"?>
+<file path=ppt/slides/slide8.xml><?xml version="1.0" encoding="utf-8"?>
 <p:sld xmlns:a="http://schemas.openxmlformats.org/drawingml/2006/main" xmlns:r="http://schemas.openxmlformats.org/officeDocument/2006/relationships" xmlns:p="http://schemas.openxmlformats.org/presentationml/2006/main">
   <p:cSld>
     <p:spTree>
@@ -6977,7 +7097,7 @@
 </p:sld>
 </file>
 
-<file path=ppt/slides/slide8.xml><?xml version="1.0" encoding="utf-8"?>
+<file path=ppt/slides/slide9.xml><?xml version="1.0" encoding="utf-8"?>
 <p:sld xmlns:a="http://schemas.openxmlformats.org/drawingml/2006/main" xmlns:r="http://schemas.openxmlformats.org/officeDocument/2006/relationships" xmlns:p="http://schemas.openxmlformats.org/presentationml/2006/main">
   <p:cSld>
     <p:spTree>
@@ -7052,90 +7172,6 @@
     <p:extLst>
       <p:ext uri="{BB962C8B-B14F-4D97-AF65-F5344CB8AC3E}">
         <p14:creationId xmlns:p14="http://schemas.microsoft.com/office/powerpoint/2010/main" val="4272254347"/>
-      </p:ext>
-    </p:extLst>
-  </p:cSld>
-  <p:clrMapOvr>
-    <a:masterClrMapping/>
-  </p:clrMapOvr>
-</p:sld>
-</file>
-
-<file path=ppt/slides/slide9.xml><?xml version="1.0" encoding="utf-8"?>
-<p:sld xmlns:a="http://schemas.openxmlformats.org/drawingml/2006/main" xmlns:r="http://schemas.openxmlformats.org/officeDocument/2006/relationships" xmlns:p="http://schemas.openxmlformats.org/presentationml/2006/main">
-  <p:cSld>
-    <p:spTree>
-      <p:nvGrpSpPr>
-        <p:cNvPr id="1" name=""/>
-        <p:cNvGrpSpPr/>
-        <p:nvPr/>
-      </p:nvGrpSpPr>
-      <p:grpSpPr>
-        <a:xfrm>
-          <a:off x="0" y="0"/>
-          <a:ext cx="0" cy="0"/>
-          <a:chOff x="0" y="0"/>
-          <a:chExt cx="0" cy="0"/>
-        </a:xfrm>
-      </p:grpSpPr>
-      <p:sp>
-        <p:nvSpPr>
-          <p:cNvPr id="2" name="Title 1">
-            <a:extLst>
-              <a:ext uri="{FF2B5EF4-FFF2-40B4-BE49-F238E27FC236}">
-                <a16:creationId xmlns:a16="http://schemas.microsoft.com/office/drawing/2014/main" id="{0AE54B6D-E5EF-2254-EC3E-732022D51D69}"/>
-              </a:ext>
-            </a:extLst>
-          </p:cNvPr>
-          <p:cNvSpPr>
-            <a:spLocks noGrp="1"/>
-          </p:cNvSpPr>
-          <p:nvPr>
-            <p:ph type="title"/>
-          </p:nvPr>
-        </p:nvSpPr>
-        <p:spPr/>
-        <p:txBody>
-          <a:bodyPr/>
-          <a:lstStyle/>
-          <a:p>
-            <a:endParaRPr lang="en-US"/>
-          </a:p>
-        </p:txBody>
-      </p:sp>
-      <p:pic>
-        <p:nvPicPr>
-          <p:cNvPr id="5" name="Content Placeholder 4">
-            <a:extLst>
-              <a:ext uri="{FF2B5EF4-FFF2-40B4-BE49-F238E27FC236}">
-                <a16:creationId xmlns:a16="http://schemas.microsoft.com/office/drawing/2014/main" id="{6B07E922-5EAC-CBB5-4BB6-8DA6C42210FB}"/>
-              </a:ext>
-            </a:extLst>
-          </p:cNvPr>
-          <p:cNvPicPr>
-            <a:picLocks noGrp="1" noChangeAspect="1"/>
-          </p:cNvPicPr>
-          <p:nvPr>
-            <p:ph idx="1"/>
-          </p:nvPr>
-        </p:nvPicPr>
-        <p:blipFill>
-          <a:blip r:embed="rId2"/>
-          <a:stretch>
-            <a:fillRect/>
-          </a:stretch>
-        </p:blipFill>
-        <p:spPr>
-          <a:xfrm>
-            <a:off x="1525853" y="2160588"/>
-            <a:ext cx="6900332" cy="3881437"/>
-          </a:xfrm>
-        </p:spPr>
-      </p:pic>
-    </p:spTree>
-    <p:extLst>
-      <p:ext uri="{BB962C8B-B14F-4D97-AF65-F5344CB8AC3E}">
-        <p14:creationId xmlns:p14="http://schemas.microsoft.com/office/powerpoint/2010/main" val="2882547128"/>
       </p:ext>
     </p:extLst>
   </p:cSld>

</xml_diff>